<commit_message>
Included GitHub link in the presentation
</commit_message>
<xml_diff>
--- a/Practical PowerShell.pptx
+++ b/Practical PowerShell.pptx
@@ -5431,8 +5431,8 @@
         </p:nvSpPr>
         <p:spPr>
           <a:xfrm>
-            <a:off x="3048000" y="4953000"/>
-            <a:ext cx="2895600" cy="923330"/>
+            <a:off x="457200" y="4851197"/>
+            <a:ext cx="7696200" cy="1477328"/>
           </a:xfrm>
           <a:prstGeom prst="rect">
             <a:avLst/>
@@ -5444,6 +5444,31 @@
           </a:bodyPr>
           <a:lstStyle/>
           <a:p>
+            <a:pPr algn="ctr"/>
+            <a:r>
+              <a:rPr lang="en-US" dirty="0">
+                <a:solidFill>
+                  <a:schemeClr val="accent5"/>
+                </a:solidFill>
+                <a:hlinkClick r:id="rId2"/>
+              </a:rPr>
+              <a:t>Downloads: https://github.com/SQLJana/Practical_PowerShell</a:t>
+            </a:r>
+            <a:endParaRPr lang="en-US" dirty="0">
+              <a:solidFill>
+                <a:schemeClr val="accent5"/>
+              </a:solidFill>
+            </a:endParaRPr>
+          </a:p>
+          <a:p>
+            <a:endParaRPr lang="en-US" dirty="0">
+              <a:solidFill>
+                <a:schemeClr val="accent5"/>
+              </a:solidFill>
+            </a:endParaRPr>
+          </a:p>
+          <a:p>
+            <a:pPr algn="ctr"/>
             <a:r>
               <a:rPr lang="en-US" dirty="0">
                 <a:solidFill>
@@ -5467,6 +5492,7 @@
             </a:endParaRPr>
           </a:p>
           <a:p>
+            <a:pPr algn="ctr"/>
             <a:r>
               <a:rPr lang="en-US" dirty="0">
                 <a:solidFill>
@@ -5490,6 +5516,7 @@
             </a:endParaRPr>
           </a:p>
           <a:p>
+            <a:pPr algn="ctr"/>
             <a:r>
               <a:rPr lang="en-US" dirty="0">
                 <a:solidFill>
@@ -8803,25 +8830,25 @@
 
 <file path=customXml/item1.xml><?xml version="1.0" encoding="utf-8"?>
 <Control xmlns="http://schemas.microsoft.com/VisualStudio/2011/storyboarding/control">
-  <Id Name="System.Storyboarding.Common.DatePicker" Revision="1" Stencil="System.Storyboarding.Common" StencilVersion="0.1"/>
+  <Id Name="System.Storyboarding.Common.DataGrid" Revision="1" Stencil="System.Storyboarding.Common" StencilVersion="0.1"/>
 </Control>
 </file>
 
 <file path=customXml/item10.xml><?xml version="1.0" encoding="utf-8"?>
 <Control xmlns="http://schemas.microsoft.com/VisualStudio/2011/storyboarding/control/v1.0">
-  <Id Name="System.Storyboarding.Media.Image" RevisionId="658c0869-8ded-44f2-a68a-f8e8fcb7d3bd" Stencil="System.Storyboarding.Media" StencilRevisionId="658c0869-8ded-44f2-a68a-f8e8fcb7d3bd" StencilVersion="0.1"/>
+  <Id Name="System.Storyboarding.Common.Text" RevisionId="68ea164d-c1de-47a5-804f-d4d1290fa524" Stencil="System.Storyboarding.Common" StencilRevisionId="68ea164d-c1de-47a5-804f-d4d1290fa524" StencilVersion="0.1"/>
 </Control>
 </file>
 
 <file path=customXml/item11.xml><?xml version="1.0" encoding="utf-8"?>
-<Control xmlns="http://schemas.microsoft.com/VisualStudio/2011/storyboarding/control">
-  <Id Name="System.Storyboarding.Common.MouseClick" Revision="1" Stencil="System.Storyboarding.Common" StencilVersion="0.1"/>
+<Control xmlns="http://schemas.microsoft.com/VisualStudio/2011/storyboarding/control/v1.0">
+  <Id Name="System.Storyboarding.Media.Image" RevisionId="658c0869-8ded-44f2-a68a-f8e8fcb7d3bd" Stencil="System.Storyboarding.Media" StencilRevisionId="658c0869-8ded-44f2-a68a-f8e8fcb7d3bd" StencilVersion="0.1"/>
 </Control>
 </file>
 
 <file path=customXml/item12.xml><?xml version="1.0" encoding="utf-8"?>
 <Control xmlns="http://schemas.microsoft.com/VisualStudio/2011/storyboarding/control/v1.0">
-  <Id Name="System.Storyboarding.Common.DropdownBox" RevisionId="68ea164d-c1de-47a5-804f-d4d1290fa524" Stencil="System.Storyboarding.Common" StencilRevisionId="68ea164d-c1de-47a5-804f-d4d1290fa524" StencilVersion="0.1"/>
+  <Id Name="System.Storyboarding.Common.Text" RevisionId="68ea164d-c1de-47a5-804f-d4d1290fa524" Stencil="System.Storyboarding.Common" StencilRevisionId="68ea164d-c1de-47a5-804f-d4d1290fa524" StencilVersion="0.1"/>
 </Control>
 </file>
 
@@ -8850,55 +8877,55 @@
 </file>
 
 <file path=customXml/item2.xml><?xml version="1.0" encoding="utf-8"?>
+<Control xmlns="http://schemas.microsoft.com/VisualStudio/2011/storyboarding/control">
+  <Id Name="System.Storyboarding.Backgrounds.SharePoint" Revision="1" Stencil="System.Storyboarding.Backgrounds" StencilVersion="0.1"/>
+</Control>
+</file>
+
+<file path=customXml/item3.xml><?xml version="1.0" encoding="utf-8"?>
+<Control xmlns="http://schemas.microsoft.com/VisualStudio/2011/storyboarding/control/v1.0">
+  <Id Name="System.Storyboarding.Common.DropdownBox" RevisionId="68ea164d-c1de-47a5-804f-d4d1290fa524" Stencil="System.Storyboarding.Common" StencilRevisionId="68ea164d-c1de-47a5-804f-d4d1290fa524" StencilVersion="0.1"/>
+</Control>
+</file>
+
+<file path=customXml/item4.xml><?xml version="1.0" encoding="utf-8"?>
 <Control xmlns="http://schemas.microsoft.com/VisualStudio/2011/storyboarding/control/v1.0">
   <Id Name="System.Storyboarding.Icons.Help" RevisionId="05cd6d03-c0b2-488e-98a7-d68de69a2cfc" Stencil="System.Storyboarding.Icons" StencilRevisionId="05cd6d03-c0b2-488e-98a7-d68de69a2cfc" StencilVersion="0.1"/>
 </Control>
 </file>
 
-<file path=customXml/item3.xml><?xml version="1.0" encoding="utf-8"?>
-<Control xmlns="http://schemas.microsoft.com/VisualStudio/2011/storyboarding/control">
-  <Id Name="System.Storyboarding.Common.DataGrid" Revision="1" Stencil="System.Storyboarding.Common" StencilVersion="0.1"/>
-</Control>
-</file>
-
-<file path=customXml/item4.xml><?xml version="1.0" encoding="utf-8"?>
+<file path=customXml/item5.xml><?xml version="1.0" encoding="utf-8"?>
 <Control xmlns="http://schemas.microsoft.com/VisualStudio/2011/storyboarding/control/v1.0">
   <Id Name="System.Storyboarding.Common.Text" RevisionId="68ea164d-c1de-47a5-804f-d4d1290fa524" Stencil="System.Storyboarding.Common" StencilRevisionId="68ea164d-c1de-47a5-804f-d4d1290fa524" StencilVersion="0.1"/>
 </Control>
 </file>
 
-<file path=customXml/item5.xml><?xml version="1.0" encoding="utf-8"?>
+<file path=customXml/item6.xml><?xml version="1.0" encoding="utf-8"?>
+<Control xmlns="http://schemas.microsoft.com/VisualStudio/2011/storyboarding/control">
+  <Id Name="System.Storyboarding.Common.DatePicker" Revision="1" Stencil="System.Storyboarding.Common" StencilVersion="0.1"/>
+</Control>
+</file>
+
+<file path=customXml/item7.xml><?xml version="1.0" encoding="utf-8"?>
+<Control xmlns="http://schemas.microsoft.com/VisualStudio/2011/storyboarding/control/v1.0">
+  <Id Name="System.Storyboarding.Icons.FolderOpen" RevisionId="05cd6d03-c0b2-488e-98a7-d68de69a2cfc" Stencil="System.Storyboarding.Icons" StencilRevisionId="05cd6d03-c0b2-488e-98a7-d68de69a2cfc" StencilVersion="0.1"/>
+</Control>
+</file>
+
+<file path=customXml/item8.xml><?xml version="1.0" encoding="utf-8"?>
+<Control xmlns="http://schemas.microsoft.com/VisualStudio/2011/storyboarding/control">
+  <Id Name="System.Storyboarding.Common.MouseClick" Revision="1" Stencil="System.Storyboarding.Common" StencilVersion="0.1"/>
+</Control>
+</file>
+
+<file path=customXml/item9.xml><?xml version="1.0" encoding="utf-8"?>
 <Control xmlns="http://schemas.microsoft.com/VisualStudio/2011/storyboarding/control/v1.0">
   <Id Name="System.Storyboarding.Common.SearchBox" RevisionId="68ea164d-c1de-47a5-804f-d4d1290fa524" Stencil="System.Storyboarding.Common" StencilRevisionId="68ea164d-c1de-47a5-804f-d4d1290fa524" StencilVersion="0.1"/>
 </Control>
 </file>
 
-<file path=customXml/item6.xml><?xml version="1.0" encoding="utf-8"?>
-<Control xmlns="http://schemas.microsoft.com/VisualStudio/2011/storyboarding/control/v1.0">
-  <Id Name="System.Storyboarding.Icons.FolderOpen" RevisionId="05cd6d03-c0b2-488e-98a7-d68de69a2cfc" Stencil="System.Storyboarding.Icons" StencilRevisionId="05cd6d03-c0b2-488e-98a7-d68de69a2cfc" StencilVersion="0.1"/>
-</Control>
-</file>
-
-<file path=customXml/item7.xml><?xml version="1.0" encoding="utf-8"?>
-<Control xmlns="http://schemas.microsoft.com/VisualStudio/2011/storyboarding/control">
-  <Id Name="System.Storyboarding.Backgrounds.SharePoint" Revision="1" Stencil="System.Storyboarding.Backgrounds" StencilVersion="0.1"/>
-</Control>
-</file>
-
-<file path=customXml/item8.xml><?xml version="1.0" encoding="utf-8"?>
-<Control xmlns="http://schemas.microsoft.com/VisualStudio/2011/storyboarding/control/v1.0">
-  <Id Name="System.Storyboarding.Common.Text" RevisionId="68ea164d-c1de-47a5-804f-d4d1290fa524" Stencil="System.Storyboarding.Common" StencilRevisionId="68ea164d-c1de-47a5-804f-d4d1290fa524" StencilVersion="0.1"/>
-</Control>
-</file>
-
-<file path=customXml/item9.xml><?xml version="1.0" encoding="utf-8"?>
-<Control xmlns="http://schemas.microsoft.com/VisualStudio/2011/storyboarding/control/v1.0">
-  <Id Name="System.Storyboarding.Common.Text" RevisionId="68ea164d-c1de-47a5-804f-d4d1290fa524" Stencil="System.Storyboarding.Common" StencilRevisionId="68ea164d-c1de-47a5-804f-d4d1290fa524" StencilVersion="0.1"/>
-</Control>
-</file>
-
 <file path=customXml/itemProps1.xml><?xml version="1.0" encoding="utf-8"?>
-<ds:datastoreItem xmlns:ds="http://schemas.openxmlformats.org/officeDocument/2006/customXml" ds:itemID="{3E6BB786-B318-4827-8E01-00032952CB6B}">
+<ds:datastoreItem xmlns:ds="http://schemas.openxmlformats.org/officeDocument/2006/customXml" ds:itemID="{A0D738B6-BAFB-45CE-AAB0-B215788D6D8B}">
   <ds:schemaRefs>
     <ds:schemaRef ds:uri="http://schemas.microsoft.com/VisualStudio/2011/storyboarding/control"/>
   </ds:schemaRefs>
@@ -8906,6 +8933,14 @@
 </file>
 
 <file path=customXml/itemProps10.xml><?xml version="1.0" encoding="utf-8"?>
+<ds:datastoreItem xmlns:ds="http://schemas.openxmlformats.org/officeDocument/2006/customXml" ds:itemID="{CC850FB3-720E-4374-974F-7E8CA11A2DF9}">
+  <ds:schemaRefs>
+    <ds:schemaRef ds:uri="http://schemas.microsoft.com/VisualStudio/2011/storyboarding/control/v1.0"/>
+  </ds:schemaRefs>
+</ds:datastoreItem>
+</file>
+
+<file path=customXml/itemProps11.xml><?xml version="1.0" encoding="utf-8"?>
 <ds:datastoreItem xmlns:ds="http://schemas.openxmlformats.org/officeDocument/2006/customXml" ds:itemID="{A58B4813-8DC3-4A90-8AE5-616746CC7976}">
   <ds:schemaRefs>
     <ds:schemaRef ds:uri="http://schemas.microsoft.com/VisualStudio/2011/storyboarding/control/v1.0"/>
@@ -8913,16 +8948,8 @@
 </ds:datastoreItem>
 </file>
 
-<file path=customXml/itemProps11.xml><?xml version="1.0" encoding="utf-8"?>
-<ds:datastoreItem xmlns:ds="http://schemas.openxmlformats.org/officeDocument/2006/customXml" ds:itemID="{7C2C89B2-A224-477F-84CA-0CA9A91B7BEC}">
-  <ds:schemaRefs>
-    <ds:schemaRef ds:uri="http://schemas.microsoft.com/VisualStudio/2011/storyboarding/control"/>
-  </ds:schemaRefs>
-</ds:datastoreItem>
-</file>
-
 <file path=customXml/itemProps12.xml><?xml version="1.0" encoding="utf-8"?>
-<ds:datastoreItem xmlns:ds="http://schemas.openxmlformats.org/officeDocument/2006/customXml" ds:itemID="{A3F8F280-994A-4692-BD3D-0368DD61E945}">
+<ds:datastoreItem xmlns:ds="http://schemas.openxmlformats.org/officeDocument/2006/customXml" ds:itemID="{72311034-BFA0-4FE8-A1F5-0FDBCC7FB9F8}">
   <ds:schemaRefs>
     <ds:schemaRef ds:uri="http://schemas.microsoft.com/VisualStudio/2011/storyboarding/control/v1.0"/>
   </ds:schemaRefs>
@@ -8930,7 +8957,7 @@
 </file>
 
 <file path=customXml/itemProps13.xml><?xml version="1.0" encoding="utf-8"?>
-<ds:datastoreItem xmlns:ds="http://schemas.openxmlformats.org/officeDocument/2006/customXml" ds:itemID="{7C66F8CD-01DB-42D4-B605-43D47A6BBC74}">
+<ds:datastoreItem xmlns:ds="http://schemas.openxmlformats.org/officeDocument/2006/customXml" ds:itemID="{CFA0390C-B4C2-4FC0-AE06-2E46107E89F9}">
   <ds:schemaRefs>
     <ds:schemaRef ds:uri="http://schemas.microsoft.com/VisualStudio/2011/storyboarding/control/v1.0"/>
   </ds:schemaRefs>
@@ -8946,7 +8973,7 @@
 </file>
 
 <file path=customXml/itemProps15.xml><?xml version="1.0" encoding="utf-8"?>
-<ds:datastoreItem xmlns:ds="http://schemas.openxmlformats.org/officeDocument/2006/customXml" ds:itemID="{CC850FB3-720E-4374-974F-7E8CA11A2DF9}">
+<ds:datastoreItem xmlns:ds="http://schemas.openxmlformats.org/officeDocument/2006/customXml" ds:itemID="{0D62B278-88A6-41D5-AF8D-13CE05EEF563}">
   <ds:schemaRefs>
     <ds:schemaRef ds:uri="http://schemas.microsoft.com/VisualStudio/2011/storyboarding/control/v1.0"/>
   </ds:schemaRefs>
@@ -8954,6 +8981,38 @@
 </file>
 
 <file path=customXml/itemProps16.xml><?xml version="1.0" encoding="utf-8"?>
+<ds:datastoreItem xmlns:ds="http://schemas.openxmlformats.org/officeDocument/2006/customXml" ds:itemID="{7C66F8CD-01DB-42D4-B605-43D47A6BBC74}">
+  <ds:schemaRefs>
+    <ds:schemaRef ds:uri="http://schemas.microsoft.com/VisualStudio/2011/storyboarding/control/v1.0"/>
+  </ds:schemaRefs>
+</ds:datastoreItem>
+</file>
+
+<file path=customXml/itemProps2.xml><?xml version="1.0" encoding="utf-8"?>
+<ds:datastoreItem xmlns:ds="http://schemas.openxmlformats.org/officeDocument/2006/customXml" ds:itemID="{14F82889-1B53-454A-BCA9-77D184AA4110}">
+  <ds:schemaRefs>
+    <ds:schemaRef ds:uri="http://schemas.microsoft.com/VisualStudio/2011/storyboarding/control"/>
+  </ds:schemaRefs>
+</ds:datastoreItem>
+</file>
+
+<file path=customXml/itemProps3.xml><?xml version="1.0" encoding="utf-8"?>
+<ds:datastoreItem xmlns:ds="http://schemas.openxmlformats.org/officeDocument/2006/customXml" ds:itemID="{A3F8F280-994A-4692-BD3D-0368DD61E945}">
+  <ds:schemaRefs>
+    <ds:schemaRef ds:uri="http://schemas.microsoft.com/VisualStudio/2011/storyboarding/control/v1.0"/>
+  </ds:schemaRefs>
+</ds:datastoreItem>
+</file>
+
+<file path=customXml/itemProps4.xml><?xml version="1.0" encoding="utf-8"?>
+<ds:datastoreItem xmlns:ds="http://schemas.openxmlformats.org/officeDocument/2006/customXml" ds:itemID="{0C3A4FF9-1621-4F0B-B187-6995024BC0BB}">
+  <ds:schemaRefs>
+    <ds:schemaRef ds:uri="http://schemas.microsoft.com/VisualStudio/2011/storyboarding/control/v1.0"/>
+  </ds:schemaRefs>
+</ds:datastoreItem>
+</file>
+
+<file path=customXml/itemProps5.xml><?xml version="1.0" encoding="utf-8"?>
 <ds:datastoreItem xmlns:ds="http://schemas.openxmlformats.org/officeDocument/2006/customXml" ds:itemID="{9B147E54-5810-4469-99DC-DD4DA2FF5FB8}">
   <ds:schemaRefs>
     <ds:schemaRef ds:uri="http://schemas.microsoft.com/VisualStudio/2011/storyboarding/control/v1.0"/>
@@ -8961,39 +9020,15 @@
 </ds:datastoreItem>
 </file>
 
-<file path=customXml/itemProps2.xml><?xml version="1.0" encoding="utf-8"?>
-<ds:datastoreItem xmlns:ds="http://schemas.openxmlformats.org/officeDocument/2006/customXml" ds:itemID="{0C3A4FF9-1621-4F0B-B187-6995024BC0BB}">
-  <ds:schemaRefs>
-    <ds:schemaRef ds:uri="http://schemas.microsoft.com/VisualStudio/2011/storyboarding/control/v1.0"/>
-  </ds:schemaRefs>
-</ds:datastoreItem>
-</file>
-
-<file path=customXml/itemProps3.xml><?xml version="1.0" encoding="utf-8"?>
-<ds:datastoreItem xmlns:ds="http://schemas.openxmlformats.org/officeDocument/2006/customXml" ds:itemID="{A0D738B6-BAFB-45CE-AAB0-B215788D6D8B}">
+<file path=customXml/itemProps6.xml><?xml version="1.0" encoding="utf-8"?>
+<ds:datastoreItem xmlns:ds="http://schemas.openxmlformats.org/officeDocument/2006/customXml" ds:itemID="{3E6BB786-B318-4827-8E01-00032952CB6B}">
   <ds:schemaRefs>
     <ds:schemaRef ds:uri="http://schemas.microsoft.com/VisualStudio/2011/storyboarding/control"/>
   </ds:schemaRefs>
 </ds:datastoreItem>
 </file>
 
-<file path=customXml/itemProps4.xml><?xml version="1.0" encoding="utf-8"?>
-<ds:datastoreItem xmlns:ds="http://schemas.openxmlformats.org/officeDocument/2006/customXml" ds:itemID="{72311034-BFA0-4FE8-A1F5-0FDBCC7FB9F8}">
-  <ds:schemaRefs>
-    <ds:schemaRef ds:uri="http://schemas.microsoft.com/VisualStudio/2011/storyboarding/control/v1.0"/>
-  </ds:schemaRefs>
-</ds:datastoreItem>
-</file>
-
-<file path=customXml/itemProps5.xml><?xml version="1.0" encoding="utf-8"?>
-<ds:datastoreItem xmlns:ds="http://schemas.openxmlformats.org/officeDocument/2006/customXml" ds:itemID="{DACF495F-4ACD-42BB-971F-37278F0A0BA5}">
-  <ds:schemaRefs>
-    <ds:schemaRef ds:uri="http://schemas.microsoft.com/VisualStudio/2011/storyboarding/control/v1.0"/>
-  </ds:schemaRefs>
-</ds:datastoreItem>
-</file>
-
-<file path=customXml/itemProps6.xml><?xml version="1.0" encoding="utf-8"?>
+<file path=customXml/itemProps7.xml><?xml version="1.0" encoding="utf-8"?>
 <ds:datastoreItem xmlns:ds="http://schemas.openxmlformats.org/officeDocument/2006/customXml" ds:itemID="{C1FC8DB3-976D-41B7-B721-B77F1B34D351}">
   <ds:schemaRefs>
     <ds:schemaRef ds:uri="http://schemas.microsoft.com/VisualStudio/2011/storyboarding/control/v1.0"/>
@@ -9001,24 +9036,16 @@
 </ds:datastoreItem>
 </file>
 
-<file path=customXml/itemProps7.xml><?xml version="1.0" encoding="utf-8"?>
-<ds:datastoreItem xmlns:ds="http://schemas.openxmlformats.org/officeDocument/2006/customXml" ds:itemID="{14F82889-1B53-454A-BCA9-77D184AA4110}">
+<file path=customXml/itemProps8.xml><?xml version="1.0" encoding="utf-8"?>
+<ds:datastoreItem xmlns:ds="http://schemas.openxmlformats.org/officeDocument/2006/customXml" ds:itemID="{7C2C89B2-A224-477F-84CA-0CA9A91B7BEC}">
   <ds:schemaRefs>
     <ds:schemaRef ds:uri="http://schemas.microsoft.com/VisualStudio/2011/storyboarding/control"/>
   </ds:schemaRefs>
 </ds:datastoreItem>
 </file>
 
-<file path=customXml/itemProps8.xml><?xml version="1.0" encoding="utf-8"?>
-<ds:datastoreItem xmlns:ds="http://schemas.openxmlformats.org/officeDocument/2006/customXml" ds:itemID="{0D62B278-88A6-41D5-AF8D-13CE05EEF563}">
-  <ds:schemaRefs>
-    <ds:schemaRef ds:uri="http://schemas.microsoft.com/VisualStudio/2011/storyboarding/control/v1.0"/>
-  </ds:schemaRefs>
-</ds:datastoreItem>
-</file>
-
 <file path=customXml/itemProps9.xml><?xml version="1.0" encoding="utf-8"?>
-<ds:datastoreItem xmlns:ds="http://schemas.openxmlformats.org/officeDocument/2006/customXml" ds:itemID="{CFA0390C-B4C2-4FC0-AE06-2E46107E89F9}">
+<ds:datastoreItem xmlns:ds="http://schemas.openxmlformats.org/officeDocument/2006/customXml" ds:itemID="{DACF495F-4ACD-42BB-971F-37278F0A0BA5}">
   <ds:schemaRefs>
     <ds:schemaRef ds:uri="http://schemas.microsoft.com/VisualStudio/2011/storyboarding/control/v1.0"/>
   </ds:schemaRefs>

</xml_diff>